<commit_message>
3. Las Escrituras [adding styles]
</commit_message>
<xml_diff>
--- a/slideshow/Teologia Sistematica y Biblica - Myer Pearlman/Clases/3. Las Escrituras.pptx
+++ b/slideshow/Teologia Sistematica y Biblica - Myer Pearlman/Clases/3. Las Escrituras.pptx
@@ -253,7 +253,7 @@
           <a:p>
             <a:fld id="{50DEE611-8BEF-4990-B4F5-91A0FAC492E5}" type="datetimeFigureOut">
               <a:rPr lang="es-VE" smtClean="0"/>
-              <a:t>26/2/2021</a:t>
+              <a:t>27/2/2021</a:t>
             </a:fld>
             <a:endParaRPr lang="es-VE" dirty="0"/>
           </a:p>
@@ -423,7 +423,7 @@
           <a:p>
             <a:fld id="{50DEE611-8BEF-4990-B4F5-91A0FAC492E5}" type="datetimeFigureOut">
               <a:rPr lang="es-VE" smtClean="0"/>
-              <a:t>26/2/2021</a:t>
+              <a:t>27/2/2021</a:t>
             </a:fld>
             <a:endParaRPr lang="es-VE" dirty="0"/>
           </a:p>
@@ -603,7 +603,7 @@
           <a:p>
             <a:fld id="{50DEE611-8BEF-4990-B4F5-91A0FAC492E5}" type="datetimeFigureOut">
               <a:rPr lang="es-VE" smtClean="0"/>
-              <a:t>26/2/2021</a:t>
+              <a:t>27/2/2021</a:t>
             </a:fld>
             <a:endParaRPr lang="es-VE" dirty="0"/>
           </a:p>
@@ -773,7 +773,7 @@
           <a:p>
             <a:fld id="{50DEE611-8BEF-4990-B4F5-91A0FAC492E5}" type="datetimeFigureOut">
               <a:rPr lang="es-VE" smtClean="0"/>
-              <a:t>26/2/2021</a:t>
+              <a:t>27/2/2021</a:t>
             </a:fld>
             <a:endParaRPr lang="es-VE" dirty="0"/>
           </a:p>
@@ -1019,7 +1019,7 @@
           <a:p>
             <a:fld id="{50DEE611-8BEF-4990-B4F5-91A0FAC492E5}" type="datetimeFigureOut">
               <a:rPr lang="es-VE" smtClean="0"/>
-              <a:t>26/2/2021</a:t>
+              <a:t>27/2/2021</a:t>
             </a:fld>
             <a:endParaRPr lang="es-VE" dirty="0"/>
           </a:p>
@@ -1251,7 +1251,7 @@
           <a:p>
             <a:fld id="{50DEE611-8BEF-4990-B4F5-91A0FAC492E5}" type="datetimeFigureOut">
               <a:rPr lang="es-VE" smtClean="0"/>
-              <a:t>26/2/2021</a:t>
+              <a:t>27/2/2021</a:t>
             </a:fld>
             <a:endParaRPr lang="es-VE" dirty="0"/>
           </a:p>
@@ -1618,7 +1618,7 @@
           <a:p>
             <a:fld id="{50DEE611-8BEF-4990-B4F5-91A0FAC492E5}" type="datetimeFigureOut">
               <a:rPr lang="es-VE" smtClean="0"/>
-              <a:t>26/2/2021</a:t>
+              <a:t>27/2/2021</a:t>
             </a:fld>
             <a:endParaRPr lang="es-VE" dirty="0"/>
           </a:p>
@@ -1736,7 +1736,7 @@
           <a:p>
             <a:fld id="{50DEE611-8BEF-4990-B4F5-91A0FAC492E5}" type="datetimeFigureOut">
               <a:rPr lang="es-VE" smtClean="0"/>
-              <a:t>26/2/2021</a:t>
+              <a:t>27/2/2021</a:t>
             </a:fld>
             <a:endParaRPr lang="es-VE" dirty="0"/>
           </a:p>
@@ -1831,7 +1831,7 @@
           <a:p>
             <a:fld id="{50DEE611-8BEF-4990-B4F5-91A0FAC492E5}" type="datetimeFigureOut">
               <a:rPr lang="es-VE" smtClean="0"/>
-              <a:t>26/2/2021</a:t>
+              <a:t>27/2/2021</a:t>
             </a:fld>
             <a:endParaRPr lang="es-VE" dirty="0"/>
           </a:p>
@@ -2108,7 +2108,7 @@
           <a:p>
             <a:fld id="{50DEE611-8BEF-4990-B4F5-91A0FAC492E5}" type="datetimeFigureOut">
               <a:rPr lang="es-VE" smtClean="0"/>
-              <a:t>26/2/2021</a:t>
+              <a:t>27/2/2021</a:t>
             </a:fld>
             <a:endParaRPr lang="es-VE" dirty="0"/>
           </a:p>
@@ -2365,7 +2365,7 @@
           <a:p>
             <a:fld id="{50DEE611-8BEF-4990-B4F5-91A0FAC492E5}" type="datetimeFigureOut">
               <a:rPr lang="es-VE" smtClean="0"/>
-              <a:t>26/2/2021</a:t>
+              <a:t>27/2/2021</a:t>
             </a:fld>
             <a:endParaRPr lang="es-VE" dirty="0"/>
           </a:p>
@@ -2432,10 +2432,7 @@
     <p:bg>
       <p:bgPr>
         <a:solidFill>
-          <a:schemeClr val="bg1">
-            <a:lumMod val="85000"/>
-            <a:lumOff val="15000"/>
-          </a:schemeClr>
+          <a:schemeClr val="bg1"/>
         </a:solidFill>
         <a:effectLst/>
       </p:bgPr>
@@ -2584,7 +2581,7 @@
           <a:p>
             <a:fld id="{50DEE611-8BEF-4990-B4F5-91A0FAC492E5}" type="datetimeFigureOut">
               <a:rPr lang="es-VE" smtClean="0"/>
-              <a:t>26/2/2021</a:t>
+              <a:t>27/2/2021</a:t>
             </a:fld>
             <a:endParaRPr lang="es-VE" dirty="0"/>
           </a:p>
@@ -3019,7 +3016,7 @@
           <a:p>
             <a:r>
               <a:rPr lang="es-VE" sz="8000" b="1" dirty="0"/>
-              <a:t>Capítulo 2: LAS ESCRITURAS</a:t>
+              <a:t>Capítulo 2: Las Escrituras</a:t>
             </a:r>
           </a:p>
         </p:txBody>
@@ -3113,8 +3110,8 @@
         </p:nvSpPr>
         <p:spPr>
           <a:xfrm>
-            <a:off x="391886" y="1"/>
-            <a:ext cx="8360228" cy="1551214"/>
+            <a:off x="228600" y="1"/>
+            <a:ext cx="8686800" cy="1551214"/>
           </a:xfrm>
         </p:spPr>
         <p:txBody>
@@ -3125,17 +3122,45 @@
           <a:p>
             <a:pPr algn="ctr"/>
             <a:r>
-              <a:rPr lang="es-VE" sz="4400" b="1" dirty="0"/>
-              <a:t>La letra de la Escrituras, sin el espíritu, mata. [</a:t>
-            </a:r>
-            <a:r>
-              <a:rPr lang="es-VE" sz="4400" b="1" dirty="0" err="1"/>
+              <a:rPr lang="es-VE" sz="3600" b="1" dirty="0"/>
+              <a:t>La letra de la Escrituras, sin el espíritu, mata.</a:t>
+            </a:r>
+            <a:br>
+              <a:rPr lang="es-VE" sz="3600" b="1" dirty="0"/>
+            </a:br>
+            <a:r>
+              <a:rPr lang="es-VE" sz="2800" b="1" dirty="0" err="1">
+                <a:solidFill>
+                  <a:srgbClr val="FFC000"/>
+                </a:solidFill>
+              </a:rPr>
               <a:t>Jn</a:t>
             </a:r>
             <a:r>
-              <a:rPr lang="es-VE" sz="4400" b="1" dirty="0"/>
-              <a:t> 6:63; 2Co 3:6.]</a:t>
-            </a:r>
+              <a:rPr lang="es-VE" sz="2800" b="1" dirty="0">
+                <a:solidFill>
+                  <a:srgbClr val="FFC000"/>
+                </a:solidFill>
+              </a:rPr>
+              <a:t> 6:63</a:t>
+            </a:r>
+            <a:r>
+              <a:rPr lang="es-VE" sz="2800" b="1" dirty="0"/>
+              <a:t> y </a:t>
+            </a:r>
+            <a:r>
+              <a:rPr lang="es-VE" sz="2800" b="1" dirty="0">
+                <a:solidFill>
+                  <a:srgbClr val="FFC000"/>
+                </a:solidFill>
+              </a:rPr>
+              <a:t>2 Co 3:6</a:t>
+            </a:r>
+            <a:r>
+              <a:rPr lang="es-VE" sz="2800" b="1" dirty="0"/>
+              <a:t>.</a:t>
+            </a:r>
+            <a:endParaRPr lang="es-VE" sz="3600" b="1" dirty="0"/>
           </a:p>
         </p:txBody>
       </p:sp>
@@ -3157,13 +3182,13 @@
         </p:nvSpPr>
         <p:spPr>
           <a:xfrm>
-            <a:off x="228600" y="1714500"/>
-            <a:ext cx="8686800" cy="3869870"/>
+            <a:off x="228600" y="1551215"/>
+            <a:ext cx="8686800" cy="4033155"/>
           </a:xfrm>
         </p:spPr>
         <p:txBody>
           <a:bodyPr anchor="ctr">
-            <a:normAutofit fontScale="92500" lnSpcReduction="20000"/>
+            <a:normAutofit lnSpcReduction="10000"/>
           </a:bodyPr>
           <a:lstStyle/>
           <a:p>
@@ -3174,6 +3199,32 @@
               <a:rPr lang="es-VE" sz="2800" b="1" dirty="0"/>
               <a:t>La letra mata de dos maneras:</a:t>
             </a:r>
+            <a:endParaRPr lang="es-VE" sz="2800" dirty="0"/>
+          </a:p>
+          <a:p>
+            <a:pPr marL="0" indent="0">
+              <a:buNone/>
+            </a:pPr>
+            <a:r>
+              <a:rPr lang="es-VE" sz="2800" b="1" dirty="0"/>
+              <a:t>1.</a:t>
+            </a:r>
+            <a:r>
+              <a:rPr lang="es-VE" sz="2800" dirty="0"/>
+              <a:t> Resulta en una muerte en vida. Antes de que Pablo se convirtiera, </a:t>
+            </a:r>
+            <a:r>
+              <a:rPr lang="es-VE" sz="2800" dirty="0">
+                <a:highlight>
+                  <a:srgbClr val="800000"/>
+                </a:highlight>
+              </a:rPr>
+              <a:t>él creía que era salvo por guardar la ley</a:t>
+            </a:r>
+            <a:r>
+              <a:rPr lang="es-VE" sz="2800" dirty="0"/>
+              <a:t>, pero todo lo que esta hizo fue matar su paz, su gozo y su esperanza.</a:t>
+            </a:r>
           </a:p>
           <a:p>
             <a:pPr marL="0" indent="0">
@@ -3182,35 +3233,60 @@
             <a:endParaRPr lang="es-VE" sz="2800" dirty="0"/>
           </a:p>
           <a:p>
-            <a:pPr marL="742950" indent="-742950">
-              <a:buAutoNum type="arabicParenR"/>
+            <a:pPr marL="0" indent="0">
+              <a:buNone/>
             </a:pPr>
             <a:r>
+              <a:rPr lang="es-VE" sz="2800" b="1" dirty="0"/>
+              <a:t>2.</a:t>
+            </a:r>
+            <a:r>
               <a:rPr lang="es-VE" sz="2800" dirty="0"/>
-              <a:t>Resulta en una muerte en vida. Antes de que Pablo se convirtiera, él creía que era salvo por guardar la ley, pero todo lo que esta hizo fue matar su paz, su gozo y su esperanza.</a:t>
-            </a:r>
-          </a:p>
-          <a:p>
-            <a:pPr marL="742950" indent="-742950">
-              <a:buAutoNum type="arabicParenR"/>
-            </a:pPr>
-            <a:endParaRPr lang="es-VE" sz="2800" dirty="0"/>
-          </a:p>
-          <a:p>
-            <a:pPr marL="742950" indent="-742950">
-              <a:buAutoNum type="arabicParenR"/>
-            </a:pPr>
+              <a:t> Resulta en muerte espiritual. Su incapacidad para guardar la ley a perfección le sentenciaba a una muerte eterna </a:t>
+            </a:r>
+            <a:r>
+              <a:rPr lang="es-VE" sz="2800" dirty="0" err="1">
+                <a:solidFill>
+                  <a:srgbClr val="FFC000"/>
+                </a:solidFill>
+              </a:rPr>
+              <a:t>Rm</a:t>
+            </a:r>
+            <a:r>
+              <a:rPr lang="es-VE" sz="2800" dirty="0">
+                <a:solidFill>
+                  <a:srgbClr val="FFC000"/>
+                </a:solidFill>
+              </a:rPr>
+              <a:t> 7:9-11</a:t>
+            </a:r>
             <a:r>
               <a:rPr lang="es-VE" sz="2800" dirty="0"/>
-              <a:t>Resulta en muerte espiritual. Su incapacidad para guardar la ley a perfección le sentenciaba a una muerte eterna (vea las notas sobre (</a:t>
-            </a:r>
-            <a:r>
-              <a:rPr lang="es-VE" sz="2800" dirty="0" err="1"/>
-              <a:t>Rm</a:t>
+              <a:t>; </a:t>
+            </a:r>
+            <a:r>
+              <a:rPr lang="es-VE" sz="2800" dirty="0">
+                <a:solidFill>
+                  <a:srgbClr val="FFC000"/>
+                </a:solidFill>
+              </a:rPr>
+              <a:t>Gal 3:10</a:t>
             </a:r>
             <a:r>
               <a:rPr lang="es-VE" sz="2800" dirty="0"/>
-              <a:t> 7:9-11; Gal 3:10). Solo Jesucristo puede producir vida eterna en todo aquel que cree.</a:t>
+              <a:t>. </a:t>
+            </a:r>
+            <a:r>
+              <a:rPr lang="es-VE" sz="2800" dirty="0">
+                <a:highlight>
+                  <a:srgbClr val="008000"/>
+                </a:highlight>
+              </a:rPr>
+              <a:t>Solo Jesucristo puede producir vida eterna en todo aquel que cree</a:t>
+            </a:r>
+            <a:r>
+              <a:rPr lang="es-VE" sz="2800" dirty="0"/>
+              <a:t>.</a:t>
             </a:r>
           </a:p>
         </p:txBody>
@@ -3305,7 +3381,7 @@
         </p:spPr>
         <p:txBody>
           <a:bodyPr anchor="ctr">
-            <a:normAutofit fontScale="62500" lnSpcReduction="20000"/>
+            <a:normAutofit/>
           </a:bodyPr>
           <a:lstStyle/>
           <a:p>
@@ -3313,31 +3389,142 @@
               <a:buNone/>
             </a:pPr>
             <a:r>
-              <a:rPr lang="es-VE" sz="4400" dirty="0"/>
-              <a:t>Solo Dios revela por medio de su Espíritu (1 Co 2:14). Dios es Espíritu, por lo tanto es el único que conoce y puede hablar al espíritu del hombre (1 Co 2:10-11; </a:t>
-            </a:r>
-            <a:r>
-              <a:rPr lang="es-VE" sz="4400" dirty="0" err="1"/>
+              <a:rPr lang="es-VE" sz="2400" dirty="0"/>
+              <a:t>Solo Dios revela por medio de su Espíritu (</a:t>
+            </a:r>
+            <a:r>
+              <a:rPr lang="es-VE" sz="2400" dirty="0">
+                <a:solidFill>
+                  <a:srgbClr val="FFC000"/>
+                </a:solidFill>
+              </a:rPr>
+              <a:t>1 Co 2:14</a:t>
+            </a:r>
+            <a:r>
+              <a:rPr lang="es-VE" sz="2400" dirty="0"/>
+              <a:t>). Dios es Espíritu, por lo tanto es el único que conoce y puede hablar al espíritu del hombre (</a:t>
+            </a:r>
+            <a:r>
+              <a:rPr lang="es-VE" sz="2400" dirty="0">
+                <a:solidFill>
+                  <a:srgbClr val="FFC000"/>
+                </a:solidFill>
+              </a:rPr>
+              <a:t>1 Co 2:10-11</a:t>
+            </a:r>
+            <a:r>
+              <a:rPr lang="es-VE" sz="2400" dirty="0"/>
+              <a:t>; </a:t>
+            </a:r>
+            <a:r>
+              <a:rPr lang="es-VE" sz="2400" dirty="0" err="1">
+                <a:solidFill>
+                  <a:srgbClr val="FFC000"/>
+                </a:solidFill>
+              </a:rPr>
               <a:t>Jn</a:t>
             </a:r>
             <a:r>
-              <a:rPr lang="es-VE" sz="4400" dirty="0"/>
-              <a:t> 4:24). Apartarnos del mal y tener un corazón humilde para aceptar su palabra (1 Co 2:9), como está escrito en Proverbios 1:7 “El principio de la sabiduría es el temor de Jehová, Los insensatos desprecian la sabiduría y la enseñanza”.</a:t>
+              <a:rPr lang="es-VE" sz="2400" dirty="0">
+                <a:solidFill>
+                  <a:srgbClr val="FFC000"/>
+                </a:solidFill>
+              </a:rPr>
+              <a:t> 4:24</a:t>
+            </a:r>
+            <a:r>
+              <a:rPr lang="es-VE" sz="2400" dirty="0"/>
+              <a:t>). </a:t>
+            </a:r>
+            <a:r>
+              <a:rPr lang="es-VE" sz="2400" dirty="0">
+                <a:highlight>
+                  <a:srgbClr val="008000"/>
+                </a:highlight>
+              </a:rPr>
+              <a:t>Apartarnos del mal y tener un corazón humilde</a:t>
+            </a:r>
+            <a:r>
+              <a:rPr lang="es-VE" sz="2400" dirty="0"/>
+              <a:t> para aceptar su palabra (</a:t>
+            </a:r>
+            <a:r>
+              <a:rPr lang="es-VE" sz="2400" dirty="0">
+                <a:solidFill>
+                  <a:srgbClr val="FFC000"/>
+                </a:solidFill>
+              </a:rPr>
+              <a:t>1 Co 2:9</a:t>
+            </a:r>
+            <a:r>
+              <a:rPr lang="es-VE" sz="2400" dirty="0"/>
+              <a:t>), como está escrito en </a:t>
+            </a:r>
+            <a:r>
+              <a:rPr lang="es-VE" sz="2400" dirty="0">
+                <a:solidFill>
+                  <a:srgbClr val="FFC000"/>
+                </a:solidFill>
+              </a:rPr>
+              <a:t>Proverbios 1:7</a:t>
+            </a:r>
+            <a:r>
+              <a:rPr lang="es-VE" sz="2400" dirty="0"/>
+              <a:t> </a:t>
+            </a:r>
+            <a:r>
+              <a:rPr lang="es-VE" sz="2400" i="1" dirty="0">
+                <a:solidFill>
+                  <a:schemeClr val="bg1">
+                    <a:lumMod val="50000"/>
+                    <a:lumOff val="50000"/>
+                  </a:schemeClr>
+                </a:solidFill>
+              </a:rPr>
+              <a:t>“El principio de la sabiduría es el temor de Jehová, Los insensatos desprecian la sabiduría y la enseñanza”</a:t>
+            </a:r>
+            <a:r>
+              <a:rPr lang="es-VE" sz="2400" dirty="0"/>
+              <a:t>.</a:t>
             </a:r>
           </a:p>
           <a:p>
             <a:pPr marL="0" indent="0">
               <a:buNone/>
             </a:pPr>
-            <a:endParaRPr lang="es-VE" sz="4400" dirty="0"/>
+            <a:endParaRPr lang="es-VE" sz="2400" dirty="0"/>
           </a:p>
           <a:p>
             <a:pPr marL="0" indent="0">
               <a:buNone/>
             </a:pPr>
             <a:r>
-              <a:rPr lang="es-VE" sz="4400" dirty="0"/>
-              <a:t>En conclusión, con un corazón lleno de resentimiento, egoísmo, maldad y paradigmas nunca le será revelada la Palabra de Dios (Sal 138:6).</a:t>
+              <a:rPr lang="es-VE" sz="2400" dirty="0"/>
+              <a:t>En conclusión, un corazón lleno de resentimiento, egoísmo, maldad y paradigmas </a:t>
+            </a:r>
+            <a:r>
+              <a:rPr lang="es-VE" sz="2400" dirty="0">
+                <a:highlight>
+                  <a:srgbClr val="800080"/>
+                </a:highlight>
+              </a:rPr>
+              <a:t>nos aparta de Dios</a:t>
+            </a:r>
+            <a:r>
+              <a:rPr lang="es-VE" sz="2400" dirty="0"/>
+              <a:t> (</a:t>
+            </a:r>
+            <a:r>
+              <a:rPr lang="es-VE" sz="2400" dirty="0">
+                <a:solidFill>
+                  <a:srgbClr val="FFC000"/>
+                </a:solidFill>
+              </a:rPr>
+              <a:t>Sal 138:6</a:t>
+            </a:r>
+            <a:r>
+              <a:rPr lang="es-VE" sz="2400" dirty="0"/>
+              <a:t>).</a:t>
             </a:r>
           </a:p>
         </p:txBody>
@@ -3444,7 +3631,11 @@
               <a:t>Son las palabras de Dios puestas en forma escrita, y son inspiración de Dios </a:t>
             </a:r>
             <a:r>
-              <a:rPr lang="es-VE" sz="4400" u="sng" dirty="0"/>
+              <a:rPr lang="es-VE" sz="4400" u="sng" dirty="0">
+                <a:solidFill>
+                  <a:srgbClr val="FFC000"/>
+                </a:solidFill>
+              </a:rPr>
               <a:t>2Ti_3:16</a:t>
             </a:r>
             <a:r>
@@ -3452,7 +3643,11 @@
               <a:t>, y han sido escritas a través hombres escogidos por él, a los cuales ha inspirado a través del Espíritu Santo. </a:t>
             </a:r>
             <a:r>
-              <a:rPr lang="es-VE" sz="4400" u="sng" dirty="0"/>
+              <a:rPr lang="es-VE" sz="4400" u="sng" dirty="0">
+                <a:solidFill>
+                  <a:srgbClr val="FFC000"/>
+                </a:solidFill>
+              </a:rPr>
               <a:t>Hch_1:16</a:t>
             </a:r>
             <a:r>
@@ -3460,7 +3655,11 @@
               <a:t>; </a:t>
             </a:r>
             <a:r>
-              <a:rPr lang="es-VE" sz="4400" u="sng" dirty="0"/>
+              <a:rPr lang="es-VE" sz="4400" u="sng" dirty="0">
+                <a:solidFill>
+                  <a:srgbClr val="FFC000"/>
+                </a:solidFill>
+              </a:rPr>
               <a:t>Heb_3:7</a:t>
             </a:r>
             <a:r>
@@ -3468,7 +3667,11 @@
               <a:t>; </a:t>
             </a:r>
             <a:r>
-              <a:rPr lang="es-VE" sz="4400" u="sng" dirty="0"/>
+              <a:rPr lang="es-VE" sz="4400" u="sng" dirty="0">
+                <a:solidFill>
+                  <a:srgbClr val="FFC000"/>
+                </a:solidFill>
+              </a:rPr>
               <a:t>2Pe_1:21</a:t>
             </a:r>
             <a:r>
@@ -3582,7 +3785,11 @@
               <a:t>La Palabra. </a:t>
             </a:r>
             <a:r>
-              <a:rPr lang="x-none" sz="2800" u="sng" dirty="0"/>
+              <a:rPr lang="x-none" sz="2800" u="sng" dirty="0">
+                <a:solidFill>
+                  <a:srgbClr val="FFC000"/>
+                </a:solidFill>
+              </a:rPr>
               <a:t>Stg_1:21-23</a:t>
             </a:r>
             <a:r>
@@ -3590,7 +3797,11 @@
               <a:t>; </a:t>
             </a:r>
             <a:r>
-              <a:rPr lang="x-none" sz="2800" u="sng" dirty="0"/>
+              <a:rPr lang="x-none" sz="2800" u="sng" dirty="0">
+                <a:solidFill>
+                  <a:srgbClr val="FFC000"/>
+                </a:solidFill>
+              </a:rPr>
               <a:t>1Pe_2:2</a:t>
             </a:r>
             <a:r>
@@ -3609,7 +3820,11 @@
               <a:t>La Palabra de Dios. </a:t>
             </a:r>
             <a:r>
-              <a:rPr lang="x-none" sz="2800" u="sng" dirty="0"/>
+              <a:rPr lang="x-none" sz="2800" u="sng" dirty="0">
+                <a:solidFill>
+                  <a:srgbClr val="FFC000"/>
+                </a:solidFill>
+              </a:rPr>
               <a:t>Luc_11:28</a:t>
             </a:r>
             <a:r>
@@ -3617,7 +3832,11 @@
               <a:t>; </a:t>
             </a:r>
             <a:r>
-              <a:rPr lang="x-none" sz="2800" u="sng" dirty="0"/>
+              <a:rPr lang="x-none" sz="2800" u="sng" dirty="0">
+                <a:solidFill>
+                  <a:srgbClr val="FFC000"/>
+                </a:solidFill>
+              </a:rPr>
               <a:t>Heb_4:12</a:t>
             </a:r>
             <a:r>
@@ -3636,7 +3855,11 @@
               <a:t>La palabra de Cristo. </a:t>
             </a:r>
             <a:r>
-              <a:rPr lang="x-none" sz="2800" u="sng" dirty="0"/>
+              <a:rPr lang="x-none" sz="2800" u="sng" dirty="0">
+                <a:solidFill>
+                  <a:srgbClr val="FFC000"/>
+                </a:solidFill>
+              </a:rPr>
               <a:t>Col_3:16</a:t>
             </a:r>
             <a:r>
@@ -3655,7 +3878,11 @@
               <a:t>La palabra de verdad. </a:t>
             </a:r>
             <a:r>
-              <a:rPr lang="x-none" sz="2800" u="sng" dirty="0"/>
+              <a:rPr lang="x-none" sz="2800" u="sng" dirty="0">
+                <a:solidFill>
+                  <a:srgbClr val="FFC000"/>
+                </a:solidFill>
+              </a:rPr>
               <a:t>Stg_1:18</a:t>
             </a:r>
             <a:r>
@@ -3674,7 +3901,11 @@
               <a:t>Las Santas Escrituras </a:t>
             </a:r>
             <a:r>
-              <a:rPr lang="x-none" sz="2800" u="sng" dirty="0"/>
+              <a:rPr lang="x-none" sz="2800" u="sng" dirty="0">
+                <a:solidFill>
+                  <a:srgbClr val="FFC000"/>
+                </a:solidFill>
+              </a:rPr>
               <a:t>Rom_1:2</a:t>
             </a:r>
             <a:r>
@@ -3682,7 +3913,11 @@
               <a:t>; </a:t>
             </a:r>
             <a:r>
-              <a:rPr lang="x-none" sz="2800" u="sng" dirty="0"/>
+              <a:rPr lang="x-none" sz="2800" u="sng" dirty="0">
+                <a:solidFill>
+                  <a:srgbClr val="FFC000"/>
+                </a:solidFill>
+              </a:rPr>
               <a:t>2Ti_3:15</a:t>
             </a:r>
             <a:r>
@@ -3701,7 +3936,11 @@
               <a:t>El libro de la verdad. </a:t>
             </a:r>
             <a:r>
-              <a:rPr lang="x-none" sz="2800" u="sng" dirty="0"/>
+              <a:rPr lang="x-none" sz="2800" u="sng" dirty="0">
+                <a:solidFill>
+                  <a:srgbClr val="FFC000"/>
+                </a:solidFill>
+              </a:rPr>
               <a:t>Dan_10:21</a:t>
             </a:r>
             <a:r>
@@ -3719,7 +3958,11 @@
               <a:t>El libro. </a:t>
             </a:r>
             <a:r>
-              <a:rPr lang="x-none" sz="2800" u="sng" dirty="0"/>
+              <a:rPr lang="x-none" sz="2800" u="sng" dirty="0">
+                <a:solidFill>
+                  <a:srgbClr val="FFC000"/>
+                </a:solidFill>
+              </a:rPr>
               <a:t>Sal_40:7</a:t>
             </a:r>
             <a:r>
@@ -3727,7 +3970,11 @@
               <a:t>; </a:t>
             </a:r>
             <a:r>
-              <a:rPr lang="x-none" sz="2800" u="sng" dirty="0"/>
+              <a:rPr lang="x-none" sz="2800" u="sng" dirty="0">
+                <a:solidFill>
+                  <a:srgbClr val="FFC000"/>
+                </a:solidFill>
+              </a:rPr>
               <a:t>Apo_22:19</a:t>
             </a:r>
             <a:r>
@@ -3754,7 +4001,11 @@
               <a:t>. </a:t>
             </a:r>
             <a:r>
-              <a:rPr lang="x-none" sz="2800" u="sng" dirty="0"/>
+              <a:rPr lang="x-none" sz="2800" u="sng" dirty="0">
+                <a:solidFill>
+                  <a:srgbClr val="FFC000"/>
+                </a:solidFill>
+              </a:rPr>
               <a:t>Isa_34:16</a:t>
             </a:r>
             <a:r>
@@ -3773,7 +4024,11 @@
               <a:t>El libro de la ley. </a:t>
             </a:r>
             <a:r>
-              <a:rPr lang="x-none" sz="2800" u="sng" dirty="0"/>
+              <a:rPr lang="x-none" sz="2800" u="sng" dirty="0">
+                <a:solidFill>
+                  <a:srgbClr val="FFC000"/>
+                </a:solidFill>
+              </a:rPr>
               <a:t>Neh_8:3</a:t>
             </a:r>
             <a:r>
@@ -3781,7 +4036,11 @@
               <a:t>; </a:t>
             </a:r>
             <a:r>
-              <a:rPr lang="x-none" sz="2800" u="sng" dirty="0"/>
+              <a:rPr lang="x-none" sz="2800" u="sng" dirty="0">
+                <a:solidFill>
+                  <a:srgbClr val="FFC000"/>
+                </a:solidFill>
+              </a:rPr>
               <a:t>Gál_3:10</a:t>
             </a:r>
             <a:r>
@@ -3808,7 +4067,11 @@
               <a:t>. </a:t>
             </a:r>
             <a:r>
-              <a:rPr lang="x-none" sz="2800" u="sng" dirty="0"/>
+              <a:rPr lang="x-none" sz="2800" u="sng" dirty="0">
+                <a:solidFill>
+                  <a:srgbClr val="FFC000"/>
+                </a:solidFill>
+              </a:rPr>
               <a:t>Sal_1:2</a:t>
             </a:r>
             <a:r>
@@ -3816,7 +4079,11 @@
               <a:t>; </a:t>
             </a:r>
             <a:r>
-              <a:rPr lang="x-none" sz="2800" u="sng" dirty="0"/>
+              <a:rPr lang="x-none" sz="2800" u="sng" dirty="0">
+                <a:solidFill>
+                  <a:srgbClr val="FFC000"/>
+                </a:solidFill>
+              </a:rPr>
               <a:t>Isa_30:9</a:t>
             </a:r>
             <a:r>
@@ -3835,7 +4102,11 @@
               <a:t>La espada del Espíritu. </a:t>
             </a:r>
             <a:r>
-              <a:rPr lang="x-none" sz="2800" u="sng" dirty="0"/>
+              <a:rPr lang="x-none" sz="2800" u="sng" dirty="0">
+                <a:solidFill>
+                  <a:srgbClr val="FFC000"/>
+                </a:solidFill>
+              </a:rPr>
               <a:t>Efe_6:17</a:t>
             </a:r>
             <a:r>
@@ -3936,7 +4207,7 @@
         </p:spPr>
         <p:txBody>
           <a:bodyPr anchor="ctr">
-            <a:normAutofit lnSpcReduction="10000"/>
+            <a:normAutofit/>
           </a:bodyPr>
           <a:lstStyle/>
           <a:p>
@@ -3944,10 +4215,22 @@
               <a:buNone/>
             </a:pPr>
             <a:r>
-              <a:rPr lang="es-VE" sz="4400" dirty="0"/>
-              <a:t>La autoridad de las Escrituras quiere decir que todas las palabras de la Biblia son palabras de Dios de tal manera que no creer o desobedecer alguna palabra de las Escrituras es no creer o desobedecer a Dios.</a:t>
-            </a:r>
-            <a:endParaRPr lang="es-VE" sz="7200" dirty="0"/>
+              <a:rPr lang="es-VE" sz="4000" dirty="0"/>
+              <a:t>La autoridad de las Escrituras quiere decir que </a:t>
+            </a:r>
+            <a:r>
+              <a:rPr lang="es-VE" sz="4000" dirty="0">
+                <a:highlight>
+                  <a:srgbClr val="008080"/>
+                </a:highlight>
+              </a:rPr>
+              <a:t>todas las palabras de la Biblia son palabras de Dios</a:t>
+            </a:r>
+            <a:r>
+              <a:rPr lang="es-VE" sz="4000" dirty="0"/>
+              <a:t> de tal manera que no creer o desobedecer alguna palabra de las Escrituras es no creer o desobedecer a Dios.</a:t>
+            </a:r>
+            <a:endParaRPr lang="es-VE" sz="6600" dirty="0"/>
           </a:p>
         </p:txBody>
       </p:sp>
@@ -4058,7 +4341,67 @@
             </a:pPr>
             <a:r>
               <a:rPr lang="es-VE" sz="4400" dirty="0"/>
-              <a:t>La inerrancia se basa en el carácter de Dios que no puede mentir (He. 6:18; Ti. 1:2). Dios no puede mentir intencionalmente porque es quien dio la ley moral absoluta. No puede equivocarse porque es omnisciente. Y si la Biblia es la Palabra de Dios escrita (y lo es), entonces es sin error.</a:t>
+              <a:t>La inerrancia se basa en el carácter de Dios que no puede mentir (</a:t>
+            </a:r>
+            <a:r>
+              <a:rPr lang="es-VE" sz="4400" dirty="0">
+                <a:solidFill>
+                  <a:srgbClr val="FFC000"/>
+                </a:solidFill>
+              </a:rPr>
+              <a:t>He. 6:18</a:t>
+            </a:r>
+            <a:r>
+              <a:rPr lang="es-VE" sz="4400" dirty="0"/>
+              <a:t>; </a:t>
+            </a:r>
+            <a:r>
+              <a:rPr lang="es-VE" sz="4400" dirty="0">
+                <a:solidFill>
+                  <a:srgbClr val="FFC000"/>
+                </a:solidFill>
+              </a:rPr>
+              <a:t>Ti. 1:2</a:t>
+            </a:r>
+            <a:r>
+              <a:rPr lang="es-VE" sz="4400" dirty="0"/>
+              <a:t>). </a:t>
+            </a:r>
+            <a:r>
+              <a:rPr lang="es-VE" sz="4400" dirty="0">
+                <a:highlight>
+                  <a:srgbClr val="008080"/>
+                </a:highlight>
+              </a:rPr>
+              <a:t>Dios no puede mentir</a:t>
+            </a:r>
+            <a:r>
+              <a:rPr lang="es-VE" sz="4400" dirty="0"/>
+              <a:t> intencionalmente porque es quien dio la ley moral absoluta. </a:t>
+            </a:r>
+            <a:r>
+              <a:rPr lang="es-VE" sz="4400" dirty="0">
+                <a:highlight>
+                  <a:srgbClr val="800080"/>
+                </a:highlight>
+              </a:rPr>
+              <a:t>No puede equivocarse</a:t>
+            </a:r>
+            <a:r>
+              <a:rPr lang="es-VE" sz="4400" dirty="0"/>
+              <a:t> porque es omnisciente. Y si la Biblia es la Palabra de Dios escrita (y lo es), entonces </a:t>
+            </a:r>
+            <a:r>
+              <a:rPr lang="es-VE" sz="4400" dirty="0">
+                <a:highlight>
+                  <a:srgbClr val="800000"/>
+                </a:highlight>
+              </a:rPr>
+              <a:t>es sin error</a:t>
+            </a:r>
+            <a:r>
+              <a:rPr lang="es-VE" sz="4400" dirty="0"/>
+              <a:t>.</a:t>
             </a:r>
             <a:endParaRPr lang="es-VE" sz="7200" dirty="0"/>
           </a:p>
@@ -4163,7 +4506,11 @@
               <a:t>La norma de la enseñanza. </a:t>
             </a:r>
             <a:r>
-              <a:rPr lang="x-none" u="sng" dirty="0"/>
+              <a:rPr lang="x-none" u="sng" dirty="0">
+                <a:solidFill>
+                  <a:srgbClr val="FFC000"/>
+                </a:solidFill>
+              </a:rPr>
               <a:t>1Pe_4:11</a:t>
             </a:r>
             <a:r>
@@ -4178,7 +4525,11 @@
               <a:t>Creídas. </a:t>
             </a:r>
             <a:r>
-              <a:rPr lang="x-none" u="sng" dirty="0"/>
+              <a:rPr lang="x-none" u="sng" dirty="0">
+                <a:solidFill>
+                  <a:srgbClr val="FFC000"/>
+                </a:solidFill>
+              </a:rPr>
               <a:t>Jua_2:22</a:t>
             </a:r>
             <a:r>
@@ -4193,7 +4544,11 @@
               <a:t>Buscadas. </a:t>
             </a:r>
             <a:r>
-              <a:rPr lang="x-none" u="sng" dirty="0"/>
+              <a:rPr lang="x-none" u="sng" dirty="0">
+                <a:solidFill>
+                  <a:srgbClr val="FFC000"/>
+                </a:solidFill>
+              </a:rPr>
               <a:t>1Co_1:31</a:t>
             </a:r>
             <a:r>
@@ -4201,7 +4556,11 @@
               <a:t>; </a:t>
             </a:r>
             <a:r>
-              <a:rPr lang="x-none" u="sng" dirty="0"/>
+              <a:rPr lang="x-none" u="sng" dirty="0">
+                <a:solidFill>
+                  <a:srgbClr val="FFC000"/>
+                </a:solidFill>
+              </a:rPr>
               <a:t>1Pe_1:16</a:t>
             </a:r>
             <a:r>
@@ -4216,7 +4575,11 @@
               <a:t>Leídas. </a:t>
             </a:r>
             <a:r>
-              <a:rPr lang="x-none" u="sng" dirty="0"/>
+              <a:rPr lang="x-none" u="sng" dirty="0">
+                <a:solidFill>
+                  <a:srgbClr val="FFC000"/>
+                </a:solidFill>
+              </a:rPr>
               <a:t>Deu_17:19</a:t>
             </a:r>
             <a:r>
@@ -4224,7 +4587,11 @@
               <a:t>; </a:t>
             </a:r>
             <a:r>
-              <a:rPr lang="x-none" u="sng" dirty="0"/>
+              <a:rPr lang="x-none" u="sng" dirty="0">
+                <a:solidFill>
+                  <a:srgbClr val="FFC000"/>
+                </a:solidFill>
+              </a:rPr>
               <a:t>Isa_34:16</a:t>
             </a:r>
             <a:r>
@@ -4247,7 +4614,11 @@
               <a:t>s. </a:t>
             </a:r>
             <a:r>
-              <a:rPr lang="x-none" u="sng" dirty="0"/>
+              <a:rPr lang="x-none" u="sng" dirty="0">
+                <a:solidFill>
+                  <a:srgbClr val="FFC000"/>
+                </a:solidFill>
+              </a:rPr>
               <a:t>Deu_31:11-13</a:t>
             </a:r>
             <a:r>
@@ -4255,7 +4626,11 @@
               <a:t>; </a:t>
             </a:r>
             <a:r>
-              <a:rPr lang="x-none" u="sng" dirty="0"/>
+              <a:rPr lang="x-none" u="sng" dirty="0">
+                <a:solidFill>
+                  <a:srgbClr val="FFC000"/>
+                </a:solidFill>
+              </a:rPr>
               <a:t>Neh_8:3</a:t>
             </a:r>
             <a:r>
@@ -4263,7 +4638,11 @@
               <a:t>; </a:t>
             </a:r>
             <a:r>
-              <a:rPr lang="x-none" u="sng" dirty="0"/>
+              <a:rPr lang="x-none" u="sng" dirty="0">
+                <a:solidFill>
+                  <a:srgbClr val="FFC000"/>
+                </a:solidFill>
+              </a:rPr>
               <a:t>Jer_36:6</a:t>
             </a:r>
             <a:r>
@@ -4271,7 +4650,11 @@
               <a:t>; </a:t>
             </a:r>
             <a:r>
-              <a:rPr lang="x-none" u="sng" dirty="0"/>
+              <a:rPr lang="x-none" u="sng" dirty="0">
+                <a:solidFill>
+                  <a:srgbClr val="FFC000"/>
+                </a:solidFill>
+              </a:rPr>
               <a:t>Hch_13:15</a:t>
             </a:r>
             <a:r>
@@ -4286,7 +4669,11 @@
               <a:t>Conocidas. </a:t>
             </a:r>
             <a:r>
-              <a:rPr lang="x-none" u="sng" dirty="0"/>
+              <a:rPr lang="x-none" u="sng" dirty="0">
+                <a:solidFill>
+                  <a:srgbClr val="FFC000"/>
+                </a:solidFill>
+              </a:rPr>
               <a:t>2Ti_3:15</a:t>
             </a:r>
             <a:r>
@@ -4301,7 +4688,11 @@
               <a:t>Recibidas, no como palabra de hombres, sino como la Palabra de Dios. </a:t>
             </a:r>
             <a:r>
-              <a:rPr lang="x-none" u="sng" dirty="0"/>
+              <a:rPr lang="x-none" u="sng" dirty="0">
+                <a:solidFill>
+                  <a:srgbClr val="FFC000"/>
+                </a:solidFill>
+              </a:rPr>
               <a:t>1Ts_2:13</a:t>
             </a:r>
             <a:r>
@@ -4316,7 +4707,11 @@
               <a:t>Recibidas con mansedumbre. </a:t>
             </a:r>
             <a:r>
-              <a:rPr lang="x-none" u="sng" dirty="0"/>
+              <a:rPr lang="x-none" u="sng" dirty="0">
+                <a:solidFill>
+                  <a:srgbClr val="FFC000"/>
+                </a:solidFill>
+              </a:rPr>
               <a:t>Stg_1:21</a:t>
             </a:r>
             <a:r>
@@ -4331,7 +4726,11 @@
               <a:t>Escudriñadas. </a:t>
             </a:r>
             <a:r>
-              <a:rPr lang="x-none" u="sng" dirty="0"/>
+              <a:rPr lang="x-none" u="sng" dirty="0">
+                <a:solidFill>
+                  <a:srgbClr val="FFC000"/>
+                </a:solidFill>
+              </a:rPr>
               <a:t>Jua_5:39</a:t>
             </a:r>
             <a:r>
@@ -4339,7 +4738,11 @@
               <a:t>; </a:t>
             </a:r>
             <a:r>
-              <a:rPr lang="x-none" u="sng" dirty="0"/>
+              <a:rPr lang="x-none" u="sng" dirty="0">
+                <a:solidFill>
+                  <a:srgbClr val="FFC000"/>
+                </a:solidFill>
+              </a:rPr>
               <a:t>Jua_7:52</a:t>
             </a:r>
             <a:r>
@@ -4354,7 +4757,11 @@
               <a:t>Escudriñadas cada día. </a:t>
             </a:r>
             <a:r>
-              <a:rPr lang="x-none" u="sng" dirty="0"/>
+              <a:rPr lang="x-none" u="sng" dirty="0">
+                <a:solidFill>
+                  <a:srgbClr val="FFC000"/>
+                </a:solidFill>
+              </a:rPr>
               <a:t>Hch_17:11</a:t>
             </a:r>
             <a:r>
@@ -4369,7 +4776,11 @@
               <a:t>Atesoradas en el corazón. </a:t>
             </a:r>
             <a:r>
-              <a:rPr lang="x-none" u="sng" dirty="0"/>
+              <a:rPr lang="x-none" u="sng" dirty="0">
+                <a:solidFill>
+                  <a:srgbClr val="FFC000"/>
+                </a:solidFill>
+              </a:rPr>
               <a:t>Deu_6:6</a:t>
             </a:r>
             <a:r>
@@ -4377,7 +4788,11 @@
               <a:t>; </a:t>
             </a:r>
             <a:r>
-              <a:rPr lang="x-none" u="sng" dirty="0"/>
+              <a:rPr lang="x-none" u="sng" dirty="0">
+                <a:solidFill>
+                  <a:srgbClr val="FFC000"/>
+                </a:solidFill>
+              </a:rPr>
               <a:t>Deu_11:18</a:t>
             </a:r>
             <a:r>
@@ -4392,7 +4807,11 @@
               <a:t>Enseñadas a los hijos. </a:t>
             </a:r>
             <a:r>
-              <a:rPr lang="x-none" u="sng" dirty="0"/>
+              <a:rPr lang="x-none" u="sng" dirty="0">
+                <a:solidFill>
+                  <a:srgbClr val="FFC000"/>
+                </a:solidFill>
+              </a:rPr>
               <a:t>Deu_6:7</a:t>
             </a:r>
             <a:r>
@@ -4400,7 +4819,11 @@
               <a:t>; </a:t>
             </a:r>
             <a:r>
-              <a:rPr lang="x-none" u="sng" dirty="0"/>
+              <a:rPr lang="x-none" u="sng" dirty="0">
+                <a:solidFill>
+                  <a:srgbClr val="FFC000"/>
+                </a:solidFill>
+              </a:rPr>
               <a:t>Deu_11:19</a:t>
             </a:r>
             <a:r>
@@ -4408,7 +4831,11 @@
               <a:t>; </a:t>
             </a:r>
             <a:r>
-              <a:rPr lang="x-none" u="sng" dirty="0"/>
+              <a:rPr lang="x-none" u="sng" dirty="0">
+                <a:solidFill>
+                  <a:srgbClr val="FFC000"/>
+                </a:solidFill>
+              </a:rPr>
               <a:t>2Ti_3:15</a:t>
             </a:r>
             <a:r>
@@ -4423,7 +4850,11 @@
               <a:t>Enseñadas a todos. </a:t>
             </a:r>
             <a:r>
-              <a:rPr lang="x-none" u="sng" dirty="0"/>
+              <a:rPr lang="x-none" u="sng" dirty="0">
+                <a:solidFill>
+                  <a:srgbClr val="FFC000"/>
+                </a:solidFill>
+              </a:rPr>
               <a:t>2Cr_17:7-9</a:t>
             </a:r>
             <a:r>
@@ -4431,7 +4862,11 @@
               <a:t>; </a:t>
             </a:r>
             <a:r>
-              <a:rPr lang="x-none" u="sng" dirty="0"/>
+              <a:rPr lang="x-none" u="sng" dirty="0">
+                <a:solidFill>
+                  <a:srgbClr val="FFC000"/>
+                </a:solidFill>
+              </a:rPr>
               <a:t>Neh_8:7-8</a:t>
             </a:r>
             <a:r>
@@ -4446,7 +4881,11 @@
               <a:t>Objeto constante de conversación. </a:t>
             </a:r>
             <a:r>
-              <a:rPr lang="x-none" u="sng" dirty="0"/>
+              <a:rPr lang="x-none" u="sng" dirty="0">
+                <a:solidFill>
+                  <a:srgbClr val="FFC000"/>
+                </a:solidFill>
+              </a:rPr>
               <a:t>Deu_6:7</a:t>
             </a:r>
             <a:r>
@@ -4461,7 +4900,11 @@
               <a:t>Manejadas sin adulteración. </a:t>
             </a:r>
             <a:r>
-              <a:rPr lang="x-none" u="sng" dirty="0"/>
+              <a:rPr lang="x-none" u="sng" dirty="0">
+                <a:solidFill>
+                  <a:srgbClr val="FFC000"/>
+                </a:solidFill>
+              </a:rPr>
               <a:t>2Co_4:2</a:t>
             </a:r>
             <a:r>
@@ -4476,7 +4919,11 @@
               <a:t>Obedecidas, y no solamente oídas. </a:t>
             </a:r>
             <a:r>
-              <a:rPr lang="x-none" u="sng" dirty="0"/>
+              <a:rPr lang="x-none" u="sng" dirty="0">
+                <a:solidFill>
+                  <a:srgbClr val="FFC000"/>
+                </a:solidFill>
+              </a:rPr>
               <a:t>Mat_7:24</a:t>
             </a:r>
             <a:r>
@@ -4484,7 +4931,11 @@
               <a:t>; </a:t>
             </a:r>
             <a:r>
-              <a:rPr lang="x-none" u="sng" dirty="0"/>
+              <a:rPr lang="x-none" u="sng" dirty="0">
+                <a:solidFill>
+                  <a:srgbClr val="FFC000"/>
+                </a:solidFill>
+              </a:rPr>
               <a:t>Luc_11:28</a:t>
             </a:r>
             <a:r>
@@ -4492,7 +4943,11 @@
               <a:t>; </a:t>
             </a:r>
             <a:r>
-              <a:rPr lang="x-none" u="sng" dirty="0"/>
+              <a:rPr lang="x-none" u="sng" dirty="0">
+                <a:solidFill>
+                  <a:srgbClr val="FFC000"/>
+                </a:solidFill>
+              </a:rPr>
               <a:t>Stg_1:22</a:t>
             </a:r>
             <a:r>
@@ -4507,7 +4962,11 @@
               <a:t>Utilizadas contra nuestros enemigos espirituales. </a:t>
             </a:r>
             <a:r>
-              <a:rPr lang="x-none" u="sng" dirty="0"/>
+              <a:rPr lang="x-none" u="sng" dirty="0">
+                <a:solidFill>
+                  <a:srgbClr val="FFC000"/>
+                </a:solidFill>
+              </a:rPr>
               <a:t>Mat_4:4</a:t>
             </a:r>
             <a:r>
@@ -4515,7 +4974,11 @@
               <a:t>; </a:t>
             </a:r>
             <a:r>
-              <a:rPr lang="x-none" u="sng" dirty="0"/>
+              <a:rPr lang="x-none" u="sng" dirty="0">
+                <a:solidFill>
+                  <a:srgbClr val="FFC000"/>
+                </a:solidFill>
+              </a:rPr>
               <a:t>Mat_4:7</a:t>
             </a:r>
             <a:r>
@@ -4523,7 +4986,11 @@
               <a:t>; </a:t>
             </a:r>
             <a:r>
-              <a:rPr lang="x-none" u="sng" dirty="0"/>
+              <a:rPr lang="x-none" u="sng" dirty="0">
+                <a:solidFill>
+                  <a:srgbClr val="FFC000"/>
+                </a:solidFill>
+              </a:rPr>
               <a:t>Mat_4:10</a:t>
             </a:r>
             <a:r>
@@ -4531,7 +4998,11 @@
               <a:t>; </a:t>
             </a:r>
             <a:r>
-              <a:rPr lang="x-none" u="sng" dirty="0"/>
+              <a:rPr lang="x-none" u="sng" dirty="0">
+                <a:solidFill>
+                  <a:srgbClr val="FFC000"/>
+                </a:solidFill>
+              </a:rPr>
               <a:t>Efe_6:11</a:t>
             </a:r>
             <a:r>
@@ -4539,7 +5010,11 @@
               <a:t>; </a:t>
             </a:r>
             <a:r>
-              <a:rPr lang="x-none" u="sng" dirty="0"/>
+              <a:rPr lang="x-none" u="sng" dirty="0">
+                <a:solidFill>
+                  <a:srgbClr val="FFC000"/>
+                </a:solidFill>
+              </a:rPr>
               <a:t>Efe_6:17</a:t>
             </a:r>
             <a:r>
@@ -4598,8 +5073,8 @@
         </p:nvSpPr>
         <p:spPr>
           <a:xfrm>
-            <a:off x="391886" y="309282"/>
-            <a:ext cx="8360228" cy="1405217"/>
+            <a:off x="391886" y="178904"/>
+            <a:ext cx="8360228" cy="1212575"/>
           </a:xfrm>
         </p:spPr>
         <p:txBody>
@@ -4611,7 +5086,7 @@
             <a:pPr algn="ctr"/>
             <a:r>
               <a:rPr lang="es-VE" sz="4800" b="1" dirty="0"/>
-              <a:t>Las escrituras son necesaria para mantener la vida espiritual</a:t>
+              <a:t>Las escrituras son necesarias para mantener la vida espiritual</a:t>
             </a:r>
           </a:p>
         </p:txBody>
@@ -4634,13 +5109,13 @@
         </p:nvSpPr>
         <p:spPr>
           <a:xfrm>
-            <a:off x="228600" y="1828800"/>
-            <a:ext cx="8686800" cy="3576917"/>
+            <a:off x="228600" y="1391478"/>
+            <a:ext cx="8686800" cy="4014239"/>
           </a:xfrm>
         </p:spPr>
         <p:txBody>
           <a:bodyPr anchor="ctr">
-            <a:normAutofit fontScale="70000" lnSpcReduction="20000"/>
+            <a:normAutofit/>
           </a:bodyPr>
           <a:lstStyle/>
           <a:p>
@@ -4648,10 +5123,66 @@
               <a:buNone/>
             </a:pPr>
             <a:r>
-              <a:rPr lang="es-VE" sz="4400" dirty="0"/>
-              <a:t>Jesús dijo en Mat_4:4 (citando Deu_8:3): «No sólo de pan vive el hombre, sino de toda palabra que sale de la boca de Dios». Aquí Jesús indica que nuestra vida espiritual se mantiene mediante la alimentación diaria con la Palabra de Dios, tal como nuestra vida física se mantiene por la nutrición diaria con alimento físico. Descuidar la lectura regular de la palabra de Dios es perjudicial para la salud del alma, así como descuidar el alimento físico es perjudicial para la salud de nuestro cuerpo.</a:t>
-            </a:r>
-            <a:endParaRPr lang="es-VE" sz="7200" dirty="0"/>
+              <a:rPr lang="es-VE" sz="2800" dirty="0"/>
+              <a:t>Jesús dijo en </a:t>
+            </a:r>
+            <a:r>
+              <a:rPr lang="es-VE" sz="2800" u="sng" dirty="0">
+                <a:solidFill>
+                  <a:srgbClr val="FFC000"/>
+                </a:solidFill>
+              </a:rPr>
+              <a:t>Mat 4:4</a:t>
+            </a:r>
+            <a:r>
+              <a:rPr lang="es-VE" sz="2800" dirty="0"/>
+              <a:t> (citando </a:t>
+            </a:r>
+            <a:r>
+              <a:rPr lang="es-VE" sz="2800" u="sng" dirty="0" err="1">
+                <a:solidFill>
+                  <a:srgbClr val="FFC000"/>
+                </a:solidFill>
+              </a:rPr>
+              <a:t>Dt</a:t>
+            </a:r>
+            <a:r>
+              <a:rPr lang="es-VE" sz="2800" u="sng" dirty="0">
+                <a:solidFill>
+                  <a:srgbClr val="FFC000"/>
+                </a:solidFill>
+              </a:rPr>
+              <a:t> 8:3</a:t>
+            </a:r>
+            <a:r>
+              <a:rPr lang="es-VE" sz="2800" dirty="0"/>
+              <a:t>): </a:t>
+            </a:r>
+            <a:r>
+              <a:rPr lang="es-VE" sz="2800" i="1" dirty="0">
+                <a:solidFill>
+                  <a:srgbClr val="C00000"/>
+                </a:solidFill>
+              </a:rPr>
+              <a:t>«No sólo de pan vive el hombre, sino de toda palabra que sale de la boca de Dios»</a:t>
+            </a:r>
+            <a:r>
+              <a:rPr lang="es-VE" sz="2800" dirty="0"/>
+              <a:t>. Aquí Jesús indica que nuestra vida espiritual se mantiene mediante </a:t>
+            </a:r>
+            <a:r>
+              <a:rPr lang="es-VE" sz="2800" dirty="0">
+                <a:highlight>
+                  <a:srgbClr val="800080"/>
+                </a:highlight>
+              </a:rPr>
+              <a:t>la alimentación diaria con la Palabra de Dios</a:t>
+            </a:r>
+            <a:r>
+              <a:rPr lang="es-VE" sz="2800" dirty="0"/>
+              <a:t>, tal como nuestra vida física se mantiene por la nutrición diaria con alimento físico. Descuidar la lectura regular de la palabra de Dios es perjudicial para la salud del alma, así como descuidar el alimento físico es perjudicial para la salud de nuestro cuerpo.</a:t>
+            </a:r>
+            <a:endParaRPr lang="es-VE" sz="4800" dirty="0"/>
           </a:p>
         </p:txBody>
       </p:sp>
@@ -4703,8 +5234,8 @@
         </p:nvSpPr>
         <p:spPr>
           <a:xfrm>
-            <a:off x="391886" y="309282"/>
-            <a:ext cx="8360228" cy="1405217"/>
+            <a:off x="391886" y="309283"/>
+            <a:ext cx="8360228" cy="1171648"/>
           </a:xfrm>
         </p:spPr>
         <p:txBody>
@@ -4722,7 +5253,11 @@
               <a:rPr lang="es-VE" sz="4800" b="1" dirty="0"/>
             </a:br>
             <a:r>
-              <a:rPr lang="x-none" u="sng" dirty="0"/>
+              <a:rPr lang="x-none" u="sng" dirty="0">
+                <a:solidFill>
+                  <a:srgbClr val="FFC000"/>
+                </a:solidFill>
+              </a:rPr>
               <a:t>Luc_16:29</a:t>
             </a:r>
             <a:r>
@@ -4730,7 +5265,11 @@
               <a:t>; </a:t>
             </a:r>
             <a:r>
-              <a:rPr lang="x-none" u="sng" dirty="0"/>
+              <a:rPr lang="x-none" u="sng" dirty="0">
+                <a:solidFill>
+                  <a:srgbClr val="FFC000"/>
+                </a:solidFill>
+              </a:rPr>
               <a:t>Luc_16:31</a:t>
             </a:r>
             <a:r>
@@ -4759,13 +5298,13 @@
         </p:nvSpPr>
         <p:spPr>
           <a:xfrm>
-            <a:off x="228600" y="1828800"/>
-            <a:ext cx="8686800" cy="3576917"/>
+            <a:off x="228600" y="1480930"/>
+            <a:ext cx="8686800" cy="3924787"/>
           </a:xfrm>
         </p:spPr>
         <p:txBody>
           <a:bodyPr anchor="ctr">
-            <a:normAutofit fontScale="85000" lnSpcReduction="20000"/>
+            <a:normAutofit lnSpcReduction="10000"/>
           </a:bodyPr>
           <a:lstStyle/>
           <a:p>
@@ -4773,8 +5312,20 @@
               <a:buNone/>
             </a:pPr>
             <a:r>
-              <a:rPr lang="es-VE" sz="4400" dirty="0"/>
-              <a:t>La suficiencia de la Biblia quiere decir que la Biblia contiene todas las palabras de Dios que él quería que su pueblo tuviera en cada etapa de la historia de la redención, y que ahora contiene todo lo que necesitamos que Dios nos diga para salvación, para confiar en él perfectamente y para obedecerle perfectamente.</a:t>
+              <a:rPr lang="es-VE" sz="3600" dirty="0"/>
+              <a:t>La suficiencia de la Biblia quiere decir que la Biblia contiene todas las palabras de Dios que él quería que su pueblo tuviera en cada etapa de la historia de la redención, y que ahora </a:t>
+            </a:r>
+            <a:r>
+              <a:rPr lang="es-VE" sz="3600" dirty="0">
+                <a:highlight>
+                  <a:srgbClr val="800080"/>
+                </a:highlight>
+              </a:rPr>
+              <a:t>contiene todo lo que necesitamos</a:t>
+            </a:r>
+            <a:r>
+              <a:rPr lang="es-VE" sz="3600" dirty="0"/>
+              <a:t> que Dios nos diga para salvación, para confiar en él perfectamente y para obedecerle perfectamente.</a:t>
             </a:r>
           </a:p>
         </p:txBody>
@@ -4827,8 +5378,8 @@
         </p:nvSpPr>
         <p:spPr>
           <a:xfrm>
-            <a:off x="391886" y="309282"/>
-            <a:ext cx="8360228" cy="1405217"/>
+            <a:off x="391886" y="0"/>
+            <a:ext cx="8360228" cy="1590260"/>
           </a:xfrm>
         </p:spPr>
         <p:txBody>
@@ -4846,10 +5397,30 @@
               <a:rPr lang="es-VE" sz="3600" b="1" dirty="0"/>
             </a:br>
             <a:r>
+              <a:rPr lang="en-US" sz="2400" b="1" dirty="0">
+                <a:solidFill>
+                  <a:srgbClr val="FFC000"/>
+                </a:solidFill>
+              </a:rPr>
+              <a:t>Mateo 7:21</a:t>
+            </a:r>
+            <a:r>
               <a:rPr lang="en-US" sz="2400" b="1" dirty="0"/>
-              <a:t>Mateo 7:21 y Santiago 1:22</a:t>
-            </a:r>
-            <a:endParaRPr lang="es-VE" sz="3600" b="1" dirty="0"/>
+              <a:t> y </a:t>
+            </a:r>
+            <a:r>
+              <a:rPr lang="en-US" sz="2400" b="1" dirty="0">
+                <a:solidFill>
+                  <a:srgbClr val="FFC000"/>
+                </a:solidFill>
+              </a:rPr>
+              <a:t>Santiago 1:22</a:t>
+            </a:r>
+            <a:endParaRPr lang="es-VE" sz="3600" b="1" dirty="0">
+              <a:solidFill>
+                <a:srgbClr val="FFC000"/>
+              </a:solidFill>
+            </a:endParaRPr>
           </a:p>
         </p:txBody>
       </p:sp>
@@ -4871,13 +5442,13 @@
         </p:nvSpPr>
         <p:spPr>
           <a:xfrm>
-            <a:off x="228600" y="1828800"/>
-            <a:ext cx="8686800" cy="3576917"/>
+            <a:off x="228600" y="1590260"/>
+            <a:ext cx="8686800" cy="3815457"/>
           </a:xfrm>
         </p:spPr>
         <p:txBody>
           <a:bodyPr anchor="ctr">
-            <a:normAutofit fontScale="77500" lnSpcReduction="20000"/>
+            <a:normAutofit/>
           </a:bodyPr>
           <a:lstStyle/>
           <a:p>
@@ -4885,23 +5456,59 @@
               <a:buNone/>
             </a:pPr>
             <a:r>
-              <a:rPr lang="es-VE" sz="4400" dirty="0"/>
-              <a:t>El ser "hacedores", ser refiere a que todos los aspectos de su personalidad y estilo de vida deberían caracterizarse por la obediencia a Dios.</a:t>
+              <a:rPr lang="es-VE" sz="3200" dirty="0"/>
+              <a:t>El ser "hacedores", ser refiere a que todos los aspectos de su personalidad y estilo de vida deberían caracterizarse por la </a:t>
+            </a:r>
+            <a:r>
+              <a:rPr lang="es-VE" sz="3200" dirty="0">
+                <a:highlight>
+                  <a:srgbClr val="008000"/>
+                </a:highlight>
+              </a:rPr>
+              <a:t>obediencia a Dios</a:t>
+            </a:r>
+            <a:r>
+              <a:rPr lang="es-VE" sz="3200" dirty="0"/>
+              <a:t>.</a:t>
             </a:r>
           </a:p>
           <a:p>
             <a:pPr marL="0" indent="0" algn="ctr">
               <a:buNone/>
             </a:pPr>
-            <a:endParaRPr lang="es-VE" sz="4400" dirty="0"/>
+            <a:endParaRPr lang="es-VE" sz="3200" dirty="0"/>
           </a:p>
           <a:p>
             <a:pPr marL="0" indent="0" algn="ctr">
               <a:buNone/>
             </a:pPr>
             <a:r>
-              <a:rPr lang="es-VE" sz="4400" dirty="0"/>
-              <a:t>La esterilidad de la fe demuestra el verdadero carácter. La fe que dice pero no hace, es realmente hipócrita, la verdadera fe no dejará de producir el fruto de las buenas obras.</a:t>
+              <a:rPr lang="es-VE" sz="3200" dirty="0"/>
+              <a:t>La </a:t>
+            </a:r>
+            <a:r>
+              <a:rPr lang="es-VE" sz="3200" dirty="0">
+                <a:highlight>
+                  <a:srgbClr val="800000"/>
+                </a:highlight>
+              </a:rPr>
+              <a:t>esterilidad de la fe</a:t>
+            </a:r>
+            <a:r>
+              <a:rPr lang="es-VE" sz="3200" dirty="0"/>
+              <a:t> demuestra el verdadero carácter. La fe que dice pero no hace, es realmente hipócrita, </a:t>
+            </a:r>
+            <a:r>
+              <a:rPr lang="es-VE" sz="3200" dirty="0">
+                <a:highlight>
+                  <a:srgbClr val="008000"/>
+                </a:highlight>
+              </a:rPr>
+              <a:t>la verdadera fe no dejará de producir el fruto</a:t>
+            </a:r>
+            <a:r>
+              <a:rPr lang="es-VE" sz="3200" dirty="0"/>
+              <a:t> de las buenas obras.</a:t>
             </a:r>
           </a:p>
         </p:txBody>

</xml_diff>